<commit_message>
acpt: add scenario for series.data_labels
</commit_message>
<xml_diff>
--- a/features/steps/test_files/cht-series.pptx
+++ b/features/steps/test_files/cht-series.pptx
@@ -13,6 +13,9 @@
     <p:sldId id="261" r:id="rId7"/>
     <p:sldId id="262" r:id="rId8"/>
     <p:sldId id="263" r:id="rId9"/>
+    <p:sldId id="264" r:id="rId10"/>
+    <p:sldId id="265" r:id="rId11"/>
+    <p:sldId id="266" r:id="rId12"/>
   </p:sldIdLst>
   <p:sldSz cx="9144000" cy="6858000" type="screen4x3"/>
   <p:notesSz cx="6858000" cy="9144000"/>
@@ -315,11 +318,11 @@
           <c:showBubbleSize val="0"/>
         </c:dLbls>
         <c:gapWidth val="150"/>
-        <c:axId val="-2099245976"/>
-        <c:axId val="-2122400264"/>
+        <c:axId val="-2123702616"/>
+        <c:axId val="-2123775128"/>
       </c:barChart>
       <c:catAx>
-        <c:axId val="-2099245976"/>
+        <c:axId val="-2123702616"/>
         <c:scaling>
           <c:orientation val="minMax"/>
         </c:scaling>
@@ -328,7 +331,7 @@
         <c:majorTickMark val="out"/>
         <c:minorTickMark val="none"/>
         <c:tickLblPos val="nextTo"/>
-        <c:crossAx val="-2122400264"/>
+        <c:crossAx val="-2123775128"/>
         <c:crosses val="autoZero"/>
         <c:auto val="1"/>
         <c:lblAlgn val="ctr"/>
@@ -336,7 +339,7 @@
         <c:noMultiLvlLbl val="0"/>
       </c:catAx>
       <c:valAx>
-        <c:axId val="-2122400264"/>
+        <c:axId val="-2123775128"/>
         <c:scaling>
           <c:orientation val="minMax"/>
         </c:scaling>
@@ -347,10 +350,243 @@
         <c:majorTickMark val="out"/>
         <c:minorTickMark val="none"/>
         <c:tickLblPos val="nextTo"/>
-        <c:crossAx val="-2099245976"/>
+        <c:crossAx val="-2123702616"/>
         <c:crosses val="autoZero"/>
         <c:crossBetween val="between"/>
       </c:valAx>
+    </c:plotArea>
+    <c:legend>
+      <c:legendPos val="r"/>
+      <c:layout/>
+      <c:overlay val="0"/>
+    </c:legend>
+    <c:plotVisOnly val="1"/>
+    <c:dispBlanksAs val="gap"/>
+    <c:showDLblsOverMax val="0"/>
+  </c:chart>
+  <c:txPr>
+    <a:bodyPr/>
+    <a:lstStyle/>
+    <a:p>
+      <a:pPr>
+        <a:defRPr sz="1800"/>
+      </a:pPr>
+      <a:endParaRPr lang="en-US"/>
+    </a:p>
+  </c:txPr>
+  <c:externalData r:id="rId1">
+    <c:autoUpdate val="0"/>
+  </c:externalData>
+</c:chartSpace>
+</file>
+
+<file path=ppt/charts/chart10.xml><?xml version="1.0" encoding="utf-8"?>
+<c:chartSpace xmlns:c="http://schemas.openxmlformats.org/drawingml/2006/chart" xmlns:a="http://schemas.openxmlformats.org/drawingml/2006/main" xmlns:r="http://schemas.openxmlformats.org/officeDocument/2006/relationships">
+  <c:date1904 val="0"/>
+  <c:lang val="en-US"/>
+  <c:roundedCorners val="0"/>
+  <mc:AlternateContent xmlns:mc="http://schemas.openxmlformats.org/markup-compatibility/2006">
+    <mc:Choice xmlns:c14="http://schemas.microsoft.com/office/drawing/2007/8/2/chart" Requires="c14">
+      <c14:style val="118"/>
+    </mc:Choice>
+    <mc:Fallback>
+      <c:style val="18"/>
+    </mc:Fallback>
+  </mc:AlternateContent>
+  <c:chart>
+    <c:title>
+      <c:layout/>
+      <c:overlay val="0"/>
+    </c:title>
+    <c:autoTitleDeleted val="0"/>
+    <c:plotArea>
+      <c:layout/>
+      <c:doughnutChart>
+        <c:varyColors val="1"/>
+        <c:ser>
+          <c:idx val="0"/>
+          <c:order val="0"/>
+          <c:tx>
+            <c:strRef>
+              <c:f>Sheet1!$B$1</c:f>
+              <c:strCache>
+                <c:ptCount val="1"/>
+                <c:pt idx="0">
+                  <c:v>Sales</c:v>
+                </c:pt>
+              </c:strCache>
+            </c:strRef>
+          </c:tx>
+          <c:cat>
+            <c:strRef>
+              <c:f>Sheet1!$A$2:$A$5</c:f>
+              <c:strCache>
+                <c:ptCount val="4"/>
+                <c:pt idx="0">
+                  <c:v>1st Qtr</c:v>
+                </c:pt>
+                <c:pt idx="1">
+                  <c:v>2nd Qtr</c:v>
+                </c:pt>
+                <c:pt idx="2">
+                  <c:v>3rd Qtr</c:v>
+                </c:pt>
+                <c:pt idx="3">
+                  <c:v>4th Qtr</c:v>
+                </c:pt>
+              </c:strCache>
+            </c:strRef>
+          </c:cat>
+          <c:val>
+            <c:numRef>
+              <c:f>Sheet1!$B$2:$B$5</c:f>
+              <c:numCache>
+                <c:formatCode>General</c:formatCode>
+                <c:ptCount val="4"/>
+                <c:pt idx="0">
+                  <c:v>8.2</c:v>
+                </c:pt>
+                <c:pt idx="1">
+                  <c:v>3.2</c:v>
+                </c:pt>
+                <c:pt idx="2">
+                  <c:v>1.4</c:v>
+                </c:pt>
+                <c:pt idx="3">
+                  <c:v>1.2</c:v>
+                </c:pt>
+              </c:numCache>
+            </c:numRef>
+          </c:val>
+        </c:ser>
+        <c:dLbls>
+          <c:showLegendKey val="0"/>
+          <c:showVal val="0"/>
+          <c:showCatName val="0"/>
+          <c:showSerName val="0"/>
+          <c:showPercent val="0"/>
+          <c:showBubbleSize val="0"/>
+          <c:showLeaderLines val="1"/>
+        </c:dLbls>
+        <c:firstSliceAng val="0"/>
+        <c:holeSize val="50"/>
+      </c:doughnutChart>
+    </c:plotArea>
+    <c:legend>
+      <c:legendPos val="r"/>
+      <c:layout/>
+      <c:overlay val="0"/>
+    </c:legend>
+    <c:plotVisOnly val="1"/>
+    <c:dispBlanksAs val="gap"/>
+    <c:showDLblsOverMax val="0"/>
+  </c:chart>
+  <c:txPr>
+    <a:bodyPr/>
+    <a:lstStyle/>
+    <a:p>
+      <a:pPr>
+        <a:defRPr sz="1800"/>
+      </a:pPr>
+      <a:endParaRPr lang="en-US"/>
+    </a:p>
+  </c:txPr>
+  <c:externalData r:id="rId1">
+    <c:autoUpdate val="0"/>
+  </c:externalData>
+</c:chartSpace>
+</file>
+
+<file path=ppt/charts/chart11.xml><?xml version="1.0" encoding="utf-8"?>
+<c:chartSpace xmlns:c="http://schemas.openxmlformats.org/drawingml/2006/chart" xmlns:a="http://schemas.openxmlformats.org/drawingml/2006/main" xmlns:r="http://schemas.openxmlformats.org/officeDocument/2006/relationships">
+  <c:date1904 val="0"/>
+  <c:lang val="en-US"/>
+  <c:roundedCorners val="0"/>
+  <mc:AlternateContent xmlns:mc="http://schemas.openxmlformats.org/markup-compatibility/2006">
+    <mc:Choice xmlns:c14="http://schemas.microsoft.com/office/drawing/2007/8/2/chart" Requires="c14">
+      <c14:style val="118"/>
+    </mc:Choice>
+    <mc:Fallback>
+      <c:style val="18"/>
+    </mc:Fallback>
+  </mc:AlternateContent>
+  <c:chart>
+    <c:title>
+      <c:layout/>
+      <c:overlay val="0"/>
+    </c:title>
+    <c:autoTitleDeleted val="0"/>
+    <c:plotArea>
+      <c:layout/>
+      <c:pieChart>
+        <c:varyColors val="1"/>
+        <c:ser>
+          <c:idx val="0"/>
+          <c:order val="0"/>
+          <c:tx>
+            <c:strRef>
+              <c:f>Sheet1!$B$1</c:f>
+              <c:strCache>
+                <c:ptCount val="1"/>
+                <c:pt idx="0">
+                  <c:v>Sales</c:v>
+                </c:pt>
+              </c:strCache>
+            </c:strRef>
+          </c:tx>
+          <c:cat>
+            <c:strRef>
+              <c:f>Sheet1!$A$2:$A$5</c:f>
+              <c:strCache>
+                <c:ptCount val="4"/>
+                <c:pt idx="0">
+                  <c:v>1st Qtr</c:v>
+                </c:pt>
+                <c:pt idx="1">
+                  <c:v>2nd Qtr</c:v>
+                </c:pt>
+                <c:pt idx="2">
+                  <c:v>3rd Qtr</c:v>
+                </c:pt>
+                <c:pt idx="3">
+                  <c:v>4th Qtr</c:v>
+                </c:pt>
+              </c:strCache>
+            </c:strRef>
+          </c:cat>
+          <c:val>
+            <c:numRef>
+              <c:f>Sheet1!$B$2:$B$5</c:f>
+              <c:numCache>
+                <c:formatCode>General</c:formatCode>
+                <c:ptCount val="4"/>
+                <c:pt idx="0">
+                  <c:v>8.2</c:v>
+                </c:pt>
+                <c:pt idx="1">
+                  <c:v>3.2</c:v>
+                </c:pt>
+                <c:pt idx="2">
+                  <c:v>1.4</c:v>
+                </c:pt>
+                <c:pt idx="3">
+                  <c:v>1.2</c:v>
+                </c:pt>
+              </c:numCache>
+            </c:numRef>
+          </c:val>
+        </c:ser>
+        <c:dLbls>
+          <c:showLegendKey val="0"/>
+          <c:showVal val="0"/>
+          <c:showCatName val="0"/>
+          <c:showSerName val="0"/>
+          <c:showPercent val="0"/>
+          <c:showBubbleSize val="0"/>
+          <c:showLeaderLines val="1"/>
+        </c:dLbls>
+        <c:firstSliceAng val="0"/>
+      </c:pieChart>
     </c:plotArea>
     <c:legend>
       <c:legendPos val="r"/>
@@ -578,8 +814,8 @@
           <c:showBubbleSize val="0"/>
         </c:dLbls>
         <c:gapWidth val="150"/>
-        <c:axId val="-2102028296"/>
-        <c:axId val="-2102031448"/>
+        <c:axId val="-2101444968"/>
+        <c:axId val="-2099164840"/>
       </c:barChart>
       <c:lineChart>
         <c:grouping val="standard"/>
@@ -714,11 +950,11 @@
         </c:dLbls>
         <c:marker val="1"/>
         <c:smooth val="0"/>
-        <c:axId val="-2102028296"/>
-        <c:axId val="-2102031448"/>
+        <c:axId val="-2101444968"/>
+        <c:axId val="-2099164840"/>
       </c:lineChart>
       <c:catAx>
-        <c:axId val="-2102028296"/>
+        <c:axId val="-2101444968"/>
         <c:scaling>
           <c:orientation val="minMax"/>
         </c:scaling>
@@ -727,7 +963,7 @@
         <c:majorTickMark val="out"/>
         <c:minorTickMark val="none"/>
         <c:tickLblPos val="nextTo"/>
-        <c:crossAx val="-2102031448"/>
+        <c:crossAx val="-2099164840"/>
         <c:crosses val="autoZero"/>
         <c:auto val="1"/>
         <c:lblAlgn val="ctr"/>
@@ -735,7 +971,7 @@
         <c:noMultiLvlLbl val="0"/>
       </c:catAx>
       <c:valAx>
-        <c:axId val="-2102031448"/>
+        <c:axId val="-2099164840"/>
         <c:scaling>
           <c:orientation val="minMax"/>
         </c:scaling>
@@ -746,7 +982,7 @@
         <c:majorTickMark val="out"/>
         <c:minorTickMark val="none"/>
         <c:tickLblPos val="nextTo"/>
-        <c:crossAx val="-2102028296"/>
+        <c:crossAx val="-2101444968"/>
         <c:crosses val="autoZero"/>
         <c:crossBetween val="between"/>
       </c:valAx>
@@ -1062,11 +1298,11 @@
           <c:showBubbleSize val="0"/>
         </c:dLbls>
         <c:gapWidth val="150"/>
-        <c:axId val="-2099328744"/>
-        <c:axId val="-2099358472"/>
+        <c:axId val="-2122398632"/>
+        <c:axId val="-2099101352"/>
       </c:barChart>
       <c:catAx>
-        <c:axId val="-2099328744"/>
+        <c:axId val="-2122398632"/>
         <c:scaling>
           <c:orientation val="minMax"/>
         </c:scaling>
@@ -1075,7 +1311,7 @@
         <c:majorTickMark val="out"/>
         <c:minorTickMark val="none"/>
         <c:tickLblPos val="nextTo"/>
-        <c:crossAx val="-2099358472"/>
+        <c:crossAx val="-2099101352"/>
         <c:crosses val="autoZero"/>
         <c:auto val="1"/>
         <c:lblAlgn val="ctr"/>
@@ -1083,7 +1319,7 @@
         <c:noMultiLvlLbl val="0"/>
       </c:catAx>
       <c:valAx>
-        <c:axId val="-2099358472"/>
+        <c:axId val="-2099101352"/>
         <c:scaling>
           <c:orientation val="minMax"/>
         </c:scaling>
@@ -1094,7 +1330,7 @@
         <c:majorTickMark val="out"/>
         <c:minorTickMark val="none"/>
         <c:tickLblPos val="nextTo"/>
-        <c:crossAx val="-2099328744"/>
+        <c:crossAx val="-2122398632"/>
         <c:crosses val="autoZero"/>
         <c:crossBetween val="between"/>
       </c:valAx>
@@ -1304,11 +1540,11 @@
           <c:showBubbleSize val="0"/>
         </c:dLbls>
         <c:gapWidth val="150"/>
-        <c:axId val="-2122470440"/>
-        <c:axId val="-2102304792"/>
+        <c:axId val="-2101637736"/>
+        <c:axId val="-2101503160"/>
       </c:barChart>
       <c:catAx>
-        <c:axId val="-2122470440"/>
+        <c:axId val="-2101637736"/>
         <c:scaling>
           <c:orientation val="minMax"/>
         </c:scaling>
@@ -1317,7 +1553,7 @@
         <c:majorTickMark val="out"/>
         <c:minorTickMark val="none"/>
         <c:tickLblPos val="nextTo"/>
-        <c:crossAx val="-2102304792"/>
+        <c:crossAx val="-2101503160"/>
         <c:crosses val="autoZero"/>
         <c:auto val="1"/>
         <c:lblAlgn val="ctr"/>
@@ -1325,7 +1561,7 @@
         <c:noMultiLvlLbl val="0"/>
       </c:catAx>
       <c:valAx>
-        <c:axId val="-2102304792"/>
+        <c:axId val="-2101503160"/>
         <c:scaling>
           <c:orientation val="minMax"/>
         </c:scaling>
@@ -1336,7 +1572,7 @@
         <c:majorTickMark val="out"/>
         <c:minorTickMark val="none"/>
         <c:tickLblPos val="nextTo"/>
-        <c:crossAx val="-2122470440"/>
+        <c:crossAx val="-2101637736"/>
         <c:crosses val="autoZero"/>
         <c:crossBetween val="between"/>
       </c:valAx>
@@ -1455,11 +1691,11 @@
           <c:showPercent val="0"/>
           <c:showBubbleSize val="0"/>
         </c:dLbls>
-        <c:axId val="-2079734776"/>
-        <c:axId val="-2079731752"/>
+        <c:axId val="-2101526648"/>
+        <c:axId val="-2101487112"/>
       </c:scatterChart>
       <c:valAx>
-        <c:axId val="-2079734776"/>
+        <c:axId val="-2101526648"/>
         <c:scaling>
           <c:orientation val="minMax"/>
         </c:scaling>
@@ -1469,12 +1705,12 @@
         <c:majorTickMark val="out"/>
         <c:minorTickMark val="none"/>
         <c:tickLblPos val="nextTo"/>
-        <c:crossAx val="-2079731752"/>
+        <c:crossAx val="-2101487112"/>
         <c:crosses val="autoZero"/>
         <c:crossBetween val="midCat"/>
       </c:valAx>
       <c:valAx>
-        <c:axId val="-2079731752"/>
+        <c:axId val="-2101487112"/>
         <c:scaling>
           <c:orientation val="minMax"/>
         </c:scaling>
@@ -1485,7 +1721,7 @@
         <c:majorTickMark val="out"/>
         <c:minorTickMark val="none"/>
         <c:tickLblPos val="nextTo"/>
-        <c:crossAx val="-2079734776"/>
+        <c:crossAx val="-2101526648"/>
         <c:crosses val="autoZero"/>
         <c:crossBetween val="midCat"/>
       </c:valAx>
@@ -1619,11 +1855,11 @@
         </c:dLbls>
         <c:bubbleScale val="100"/>
         <c:showNegBubbles val="0"/>
-        <c:axId val="-2099513976"/>
-        <c:axId val="-2099510952"/>
+        <c:axId val="-2101673672"/>
+        <c:axId val="-2102027848"/>
       </c:bubbleChart>
       <c:valAx>
-        <c:axId val="-2099513976"/>
+        <c:axId val="-2101673672"/>
         <c:scaling>
           <c:orientation val="minMax"/>
         </c:scaling>
@@ -1633,12 +1869,12 @@
         <c:majorTickMark val="out"/>
         <c:minorTickMark val="none"/>
         <c:tickLblPos val="nextTo"/>
-        <c:crossAx val="-2099510952"/>
+        <c:crossAx val="-2102027848"/>
         <c:crosses val="autoZero"/>
         <c:crossBetween val="midCat"/>
       </c:valAx>
       <c:valAx>
-        <c:axId val="-2099510952"/>
+        <c:axId val="-2102027848"/>
         <c:scaling>
           <c:orientation val="minMax"/>
         </c:scaling>
@@ -1649,7 +1885,7 @@
         <c:majorTickMark val="out"/>
         <c:minorTickMark val="none"/>
         <c:tickLblPos val="nextTo"/>
-        <c:crossAx val="-2099513976"/>
+        <c:crossAx val="-2101673672"/>
         <c:crosses val="autoZero"/>
         <c:crossBetween val="midCat"/>
       </c:valAx>
@@ -1880,11 +2116,11 @@
         </c:dLbls>
         <c:marker val="1"/>
         <c:smooth val="0"/>
-        <c:axId val="-2078673672"/>
-        <c:axId val="-2078670696"/>
+        <c:axId val="-2102158104"/>
+        <c:axId val="-2102287928"/>
       </c:lineChart>
       <c:catAx>
-        <c:axId val="-2078673672"/>
+        <c:axId val="-2102158104"/>
         <c:scaling>
           <c:orientation val="minMax"/>
         </c:scaling>
@@ -1893,7 +2129,7 @@
         <c:majorTickMark val="out"/>
         <c:minorTickMark val="none"/>
         <c:tickLblPos val="nextTo"/>
-        <c:crossAx val="-2078670696"/>
+        <c:crossAx val="-2102287928"/>
         <c:crosses val="autoZero"/>
         <c:auto val="1"/>
         <c:lblAlgn val="ctr"/>
@@ -1901,7 +2137,7 @@
         <c:noMultiLvlLbl val="0"/>
       </c:catAx>
       <c:valAx>
-        <c:axId val="-2078670696"/>
+        <c:axId val="-2102287928"/>
         <c:scaling>
           <c:orientation val="minMax"/>
         </c:scaling>
@@ -1912,7 +2148,7 @@
         <c:majorTickMark val="out"/>
         <c:minorTickMark val="none"/>
         <c:tickLblPos val="nextTo"/>
-        <c:crossAx val="-2078673672"/>
+        <c:crossAx val="-2102158104"/>
         <c:crosses val="autoZero"/>
         <c:crossBetween val="between"/>
       </c:valAx>
@@ -2096,11 +2332,11 @@
           <c:showPercent val="0"/>
           <c:showBubbleSize val="0"/>
         </c:dLbls>
-        <c:axId val="-2099455464"/>
-        <c:axId val="-2099388856"/>
+        <c:axId val="-2102323288"/>
+        <c:axId val="-2102295848"/>
       </c:radarChart>
       <c:catAx>
-        <c:axId val="-2099455464"/>
+        <c:axId val="-2102323288"/>
         <c:scaling>
           <c:orientation val="minMax"/>
         </c:scaling>
@@ -2111,7 +2347,7 @@
         <c:majorTickMark val="out"/>
         <c:minorTickMark val="none"/>
         <c:tickLblPos val="nextTo"/>
-        <c:crossAx val="-2099388856"/>
+        <c:crossAx val="-2102295848"/>
         <c:crosses val="autoZero"/>
         <c:auto val="1"/>
         <c:lblAlgn val="ctr"/>
@@ -2119,7 +2355,7 @@
         <c:noMultiLvlLbl val="0"/>
       </c:catAx>
       <c:valAx>
-        <c:axId val="-2099388856"/>
+        <c:axId val="-2102295848"/>
         <c:scaling>
           <c:orientation val="minMax"/>
         </c:scaling>
@@ -2130,7 +2366,7 @@
         <c:majorTickMark val="cross"/>
         <c:minorTickMark val="none"/>
         <c:tickLblPos val="nextTo"/>
-        <c:crossAx val="-2099455464"/>
+        <c:crossAx val="-2102323288"/>
         <c:crosses val="autoZero"/>
         <c:crossBetween val="between"/>
       </c:valAx>
@@ -2142,6 +2378,222 @@
     </c:legend>
     <c:plotVisOnly val="1"/>
     <c:dispBlanksAs val="gap"/>
+    <c:showDLblsOverMax val="0"/>
+  </c:chart>
+  <c:txPr>
+    <a:bodyPr/>
+    <a:lstStyle/>
+    <a:p>
+      <a:pPr>
+        <a:defRPr sz="1800"/>
+      </a:pPr>
+      <a:endParaRPr lang="en-US"/>
+    </a:p>
+  </c:txPr>
+  <c:externalData r:id="rId1">
+    <c:autoUpdate val="0"/>
+  </c:externalData>
+</c:chartSpace>
+</file>
+
+<file path=ppt/charts/chart9.xml><?xml version="1.0" encoding="utf-8"?>
+<c:chartSpace xmlns:c="http://schemas.openxmlformats.org/drawingml/2006/chart" xmlns:a="http://schemas.openxmlformats.org/drawingml/2006/main" xmlns:r="http://schemas.openxmlformats.org/officeDocument/2006/relationships">
+  <c:date1904 val="0"/>
+  <c:lang val="en-US"/>
+  <c:roundedCorners val="0"/>
+  <mc:AlternateContent xmlns:mc="http://schemas.openxmlformats.org/markup-compatibility/2006">
+    <mc:Choice xmlns:c14="http://schemas.microsoft.com/office/drawing/2007/8/2/chart" Requires="c14">
+      <c14:style val="118"/>
+    </mc:Choice>
+    <mc:Fallback>
+      <c:style val="18"/>
+    </mc:Fallback>
+  </mc:AlternateContent>
+  <c:chart>
+    <c:autoTitleDeleted val="0"/>
+    <c:plotArea>
+      <c:layout/>
+      <c:areaChart>
+        <c:grouping val="standard"/>
+        <c:varyColors val="0"/>
+        <c:ser>
+          <c:idx val="0"/>
+          <c:order val="0"/>
+          <c:tx>
+            <c:strRef>
+              <c:f>Sheet1!$B$1</c:f>
+              <c:strCache>
+                <c:ptCount val="1"/>
+                <c:pt idx="0">
+                  <c:v>Series 1</c:v>
+                </c:pt>
+              </c:strCache>
+            </c:strRef>
+          </c:tx>
+          <c:cat>
+            <c:numRef>
+              <c:f>Sheet1!$A$2:$A$6</c:f>
+              <c:numCache>
+                <c:formatCode>m/d/yy</c:formatCode>
+                <c:ptCount val="5"/>
+                <c:pt idx="0">
+                  <c:v>37261.0</c:v>
+                </c:pt>
+                <c:pt idx="1">
+                  <c:v>37262.0</c:v>
+                </c:pt>
+                <c:pt idx="2">
+                  <c:v>37263.0</c:v>
+                </c:pt>
+                <c:pt idx="3">
+                  <c:v>37264.0</c:v>
+                </c:pt>
+                <c:pt idx="4">
+                  <c:v>37265.0</c:v>
+                </c:pt>
+              </c:numCache>
+            </c:numRef>
+          </c:cat>
+          <c:val>
+            <c:numRef>
+              <c:f>Sheet1!$B$2:$B$6</c:f>
+              <c:numCache>
+                <c:formatCode>General</c:formatCode>
+                <c:ptCount val="5"/>
+                <c:pt idx="0">
+                  <c:v>32.0</c:v>
+                </c:pt>
+                <c:pt idx="1">
+                  <c:v>32.0</c:v>
+                </c:pt>
+                <c:pt idx="2">
+                  <c:v>28.0</c:v>
+                </c:pt>
+                <c:pt idx="3">
+                  <c:v>12.0</c:v>
+                </c:pt>
+                <c:pt idx="4">
+                  <c:v>15.0</c:v>
+                </c:pt>
+              </c:numCache>
+            </c:numRef>
+          </c:val>
+        </c:ser>
+        <c:ser>
+          <c:idx val="1"/>
+          <c:order val="1"/>
+          <c:tx>
+            <c:strRef>
+              <c:f>Sheet1!$C$1</c:f>
+              <c:strCache>
+                <c:ptCount val="1"/>
+                <c:pt idx="0">
+                  <c:v>Series 2</c:v>
+                </c:pt>
+              </c:strCache>
+            </c:strRef>
+          </c:tx>
+          <c:cat>
+            <c:numRef>
+              <c:f>Sheet1!$A$2:$A$6</c:f>
+              <c:numCache>
+                <c:formatCode>m/d/yy</c:formatCode>
+                <c:ptCount val="5"/>
+                <c:pt idx="0">
+                  <c:v>37261.0</c:v>
+                </c:pt>
+                <c:pt idx="1">
+                  <c:v>37262.0</c:v>
+                </c:pt>
+                <c:pt idx="2">
+                  <c:v>37263.0</c:v>
+                </c:pt>
+                <c:pt idx="3">
+                  <c:v>37264.0</c:v>
+                </c:pt>
+                <c:pt idx="4">
+                  <c:v>37265.0</c:v>
+                </c:pt>
+              </c:numCache>
+            </c:numRef>
+          </c:cat>
+          <c:val>
+            <c:numRef>
+              <c:f>Sheet1!$C$2:$C$6</c:f>
+              <c:numCache>
+                <c:formatCode>General</c:formatCode>
+                <c:ptCount val="5"/>
+                <c:pt idx="0">
+                  <c:v>12.0</c:v>
+                </c:pt>
+                <c:pt idx="1">
+                  <c:v>12.0</c:v>
+                </c:pt>
+                <c:pt idx="2">
+                  <c:v>12.0</c:v>
+                </c:pt>
+                <c:pt idx="3">
+                  <c:v>21.0</c:v>
+                </c:pt>
+                <c:pt idx="4">
+                  <c:v>28.0</c:v>
+                </c:pt>
+              </c:numCache>
+            </c:numRef>
+          </c:val>
+        </c:ser>
+        <c:dLbls>
+          <c:showLegendKey val="0"/>
+          <c:showVal val="0"/>
+          <c:showCatName val="0"/>
+          <c:showSerName val="0"/>
+          <c:showPercent val="0"/>
+          <c:showBubbleSize val="0"/>
+        </c:dLbls>
+        <c:axId val="2047045784"/>
+        <c:axId val="-2097259944"/>
+      </c:areaChart>
+      <c:dateAx>
+        <c:axId val="2047045784"/>
+        <c:scaling>
+          <c:orientation val="minMax"/>
+        </c:scaling>
+        <c:delete val="0"/>
+        <c:axPos val="b"/>
+        <c:numFmt formatCode="m/d/yy" sourceLinked="1"/>
+        <c:majorTickMark val="out"/>
+        <c:minorTickMark val="none"/>
+        <c:tickLblPos val="nextTo"/>
+        <c:crossAx val="-2097259944"/>
+        <c:crosses val="autoZero"/>
+        <c:auto val="1"/>
+        <c:lblOffset val="100"/>
+        <c:baseTimeUnit val="days"/>
+      </c:dateAx>
+      <c:valAx>
+        <c:axId val="-2097259944"/>
+        <c:scaling>
+          <c:orientation val="minMax"/>
+        </c:scaling>
+        <c:delete val="0"/>
+        <c:axPos val="l"/>
+        <c:majorGridlines/>
+        <c:numFmt formatCode="General" sourceLinked="1"/>
+        <c:majorTickMark val="out"/>
+        <c:minorTickMark val="none"/>
+        <c:tickLblPos val="nextTo"/>
+        <c:crossAx val="2047045784"/>
+        <c:crosses val="autoZero"/>
+        <c:crossBetween val="midCat"/>
+      </c:valAx>
+    </c:plotArea>
+    <c:legend>
+      <c:legendPos val="r"/>
+      <c:layout/>
+      <c:overlay val="0"/>
+    </c:legend>
+    <c:plotVisOnly val="1"/>
+    <c:dispBlanksAs val="zero"/>
     <c:showDLblsOverMax val="0"/>
   </c:chart>
   <c:txPr>
@@ -2509,6 +2961,110 @@
     <p:extLst>
       <p:ext uri="{BB962C8B-B14F-4D97-AF65-F5344CB8AC3E}">
         <p14:creationId xmlns:p14="http://schemas.microsoft.com/office/powerpoint/2010/main" val="3714135160"/>
+      </p:ext>
+    </p:extLst>
+  </p:cSld>
+  <p:clrMapOvr>
+    <a:masterClrMapping/>
+  </p:clrMapOvr>
+</p:sld>
+</file>
+
+<file path=ppt/slides/slide10.xml><?xml version="1.0" encoding="utf-8"?>
+<p:sld xmlns:a="http://schemas.openxmlformats.org/drawingml/2006/main" xmlns:r="http://schemas.openxmlformats.org/officeDocument/2006/relationships" xmlns:p="http://schemas.openxmlformats.org/presentationml/2006/main">
+  <p:cSld>
+    <p:spTree>
+      <p:nvGrpSpPr>
+        <p:cNvPr id="1" name=""/>
+        <p:cNvGrpSpPr/>
+        <p:nvPr/>
+      </p:nvGrpSpPr>
+      <p:grpSpPr>
+        <a:xfrm>
+          <a:off x="0" y="0"/>
+          <a:ext cx="0" cy="0"/>
+          <a:chOff x="0" y="0"/>
+          <a:chExt cx="0" cy="0"/>
+        </a:xfrm>
+      </p:grpSpPr>
+      <p:graphicFrame>
+        <p:nvGraphicFramePr>
+          <p:cNvPr id="2" name="Chart 1"/>
+          <p:cNvGraphicFramePr/>
+          <p:nvPr>
+            <p:extLst>
+              <p:ext uri="{D42A27DB-BD31-4B8C-83A1-F6EECF244321}">
+                <p14:modId xmlns:p14="http://schemas.microsoft.com/office/powerpoint/2010/main" val="1815943271"/>
+              </p:ext>
+            </p:extLst>
+          </p:nvPr>
+        </p:nvGraphicFramePr>
+        <p:xfrm>
+          <a:off x="1524000" y="1397000"/>
+          <a:ext cx="6096000" cy="4064000"/>
+        </p:xfrm>
+        <a:graphic>
+          <a:graphicData uri="http://schemas.openxmlformats.org/drawingml/2006/chart">
+            <c:chart xmlns:c="http://schemas.openxmlformats.org/drawingml/2006/chart" xmlns:r="http://schemas.openxmlformats.org/officeDocument/2006/relationships" r:id="rId2"/>
+          </a:graphicData>
+        </a:graphic>
+      </p:graphicFrame>
+    </p:spTree>
+    <p:extLst>
+      <p:ext uri="{BB962C8B-B14F-4D97-AF65-F5344CB8AC3E}">
+        <p14:creationId xmlns:p14="http://schemas.microsoft.com/office/powerpoint/2010/main" val="1747597231"/>
+      </p:ext>
+    </p:extLst>
+  </p:cSld>
+  <p:clrMapOvr>
+    <a:masterClrMapping/>
+  </p:clrMapOvr>
+</p:sld>
+</file>
+
+<file path=ppt/slides/slide11.xml><?xml version="1.0" encoding="utf-8"?>
+<p:sld xmlns:a="http://schemas.openxmlformats.org/drawingml/2006/main" xmlns:r="http://schemas.openxmlformats.org/officeDocument/2006/relationships" xmlns:p="http://schemas.openxmlformats.org/presentationml/2006/main">
+  <p:cSld>
+    <p:spTree>
+      <p:nvGrpSpPr>
+        <p:cNvPr id="1" name=""/>
+        <p:cNvGrpSpPr/>
+        <p:nvPr/>
+      </p:nvGrpSpPr>
+      <p:grpSpPr>
+        <a:xfrm>
+          <a:off x="0" y="0"/>
+          <a:ext cx="0" cy="0"/>
+          <a:chOff x="0" y="0"/>
+          <a:chExt cx="0" cy="0"/>
+        </a:xfrm>
+      </p:grpSpPr>
+      <p:graphicFrame>
+        <p:nvGraphicFramePr>
+          <p:cNvPr id="2" name="Chart 1"/>
+          <p:cNvGraphicFramePr/>
+          <p:nvPr>
+            <p:extLst>
+              <p:ext uri="{D42A27DB-BD31-4B8C-83A1-F6EECF244321}">
+                <p14:modId xmlns:p14="http://schemas.microsoft.com/office/powerpoint/2010/main" val="3044460690"/>
+              </p:ext>
+            </p:extLst>
+          </p:nvPr>
+        </p:nvGraphicFramePr>
+        <p:xfrm>
+          <a:off x="1524000" y="1397000"/>
+          <a:ext cx="6096000" cy="4064000"/>
+        </p:xfrm>
+        <a:graphic>
+          <a:graphicData uri="http://schemas.openxmlformats.org/drawingml/2006/chart">
+            <c:chart xmlns:c="http://schemas.openxmlformats.org/drawingml/2006/chart" xmlns:r="http://schemas.openxmlformats.org/officeDocument/2006/relationships" r:id="rId2"/>
+          </a:graphicData>
+        </a:graphic>
+      </p:graphicFrame>
+    </p:spTree>
+    <p:extLst>
+      <p:ext uri="{BB962C8B-B14F-4D97-AF65-F5344CB8AC3E}">
+        <p14:creationId xmlns:p14="http://schemas.microsoft.com/office/powerpoint/2010/main" val="2566811545"/>
       </p:ext>
     </p:extLst>
   </p:cSld>
@@ -2889,6 +3445,58 @@
 </p:sld>
 </file>
 
+<file path=ppt/slides/slide9.xml><?xml version="1.0" encoding="utf-8"?>
+<p:sld xmlns:a="http://schemas.openxmlformats.org/drawingml/2006/main" xmlns:r="http://schemas.openxmlformats.org/officeDocument/2006/relationships" xmlns:p="http://schemas.openxmlformats.org/presentationml/2006/main">
+  <p:cSld>
+    <p:spTree>
+      <p:nvGrpSpPr>
+        <p:cNvPr id="1" name=""/>
+        <p:cNvGrpSpPr/>
+        <p:nvPr/>
+      </p:nvGrpSpPr>
+      <p:grpSpPr>
+        <a:xfrm>
+          <a:off x="0" y="0"/>
+          <a:ext cx="0" cy="0"/>
+          <a:chOff x="0" y="0"/>
+          <a:chExt cx="0" cy="0"/>
+        </a:xfrm>
+      </p:grpSpPr>
+      <p:graphicFrame>
+        <p:nvGraphicFramePr>
+          <p:cNvPr id="2" name="Chart 1"/>
+          <p:cNvGraphicFramePr/>
+          <p:nvPr>
+            <p:extLst>
+              <p:ext uri="{D42A27DB-BD31-4B8C-83A1-F6EECF244321}">
+                <p14:modId xmlns:p14="http://schemas.microsoft.com/office/powerpoint/2010/main" val="3087411406"/>
+              </p:ext>
+            </p:extLst>
+          </p:nvPr>
+        </p:nvGraphicFramePr>
+        <p:xfrm>
+          <a:off x="1524000" y="1397000"/>
+          <a:ext cx="6096000" cy="4064000"/>
+        </p:xfrm>
+        <a:graphic>
+          <a:graphicData uri="http://schemas.openxmlformats.org/drawingml/2006/chart">
+            <c:chart xmlns:c="http://schemas.openxmlformats.org/drawingml/2006/chart" xmlns:r="http://schemas.openxmlformats.org/officeDocument/2006/relationships" r:id="rId2"/>
+          </a:graphicData>
+        </a:graphic>
+      </p:graphicFrame>
+    </p:spTree>
+    <p:extLst>
+      <p:ext uri="{BB962C8B-B14F-4D97-AF65-F5344CB8AC3E}">
+        <p14:creationId xmlns:p14="http://schemas.microsoft.com/office/powerpoint/2010/main" val="191251657"/>
+      </p:ext>
+    </p:extLst>
+  </p:cSld>
+  <p:clrMapOvr>
+    <a:masterClrMapping/>
+  </p:clrMapOvr>
+</p:sld>
+</file>
+
 <file path=ppt/theme/theme1.xml><?xml version="1.0" encoding="utf-8"?>
 <a:theme xmlns:a="http://schemas.openxmlformats.org/drawingml/2006/main" name="Office Theme">
   <a:themeElements>

</xml_diff>